<commit_message>
preparing files for saturday 01
I am preparing files for saturday.  From now on, I will make my comments a bit clearer
</commit_message>
<xml_diff>
--- a/United Way.pptx
+++ b/United Way.pptx
@@ -222,7 +222,7 @@
           <a:p>
             <a:fld id="{2BAFC654-BA43-42E4-AB3E-078F40F7F10A}" type="datetimeFigureOut">
               <a:rPr lang="en-US" smtClean="0"/>
-              <a:t>2/13/2018</a:t>
+              <a:t>2/14/2018</a:t>
             </a:fld>
             <a:endParaRPr lang="en-US"/>
           </a:p>
@@ -1034,7 +1034,7 @@
           <a:p>
             <a:fld id="{CF630EC3-FE51-44CC-ADE4-A9AF53AF4C2B}" type="datetimeFigureOut">
               <a:rPr lang="en-US" smtClean="0"/>
-              <a:t>2/13/2018</a:t>
+              <a:t>2/14/2018</a:t>
             </a:fld>
             <a:endParaRPr lang="en-US"/>
           </a:p>
@@ -1204,7 +1204,7 @@
           <a:p>
             <a:fld id="{CF630EC3-FE51-44CC-ADE4-A9AF53AF4C2B}" type="datetimeFigureOut">
               <a:rPr lang="en-US" smtClean="0"/>
-              <a:t>2/13/2018</a:t>
+              <a:t>2/14/2018</a:t>
             </a:fld>
             <a:endParaRPr lang="en-US"/>
           </a:p>
@@ -1427,7 +1427,7 @@
           <a:p>
             <a:fld id="{CF630EC3-FE51-44CC-ADE4-A9AF53AF4C2B}" type="datetimeFigureOut">
               <a:rPr lang="en-US" smtClean="0"/>
-              <a:t>2/13/2018</a:t>
+              <a:t>2/14/2018</a:t>
             </a:fld>
             <a:endParaRPr lang="en-US"/>
           </a:p>
@@ -1607,7 +1607,7 @@
           <a:p>
             <a:fld id="{CF630EC3-FE51-44CC-ADE4-A9AF53AF4C2B}" type="datetimeFigureOut">
               <a:rPr lang="en-US" smtClean="0"/>
-              <a:t>2/13/2018</a:t>
+              <a:t>2/14/2018</a:t>
             </a:fld>
             <a:endParaRPr lang="en-US"/>
           </a:p>
@@ -1913,7 +1913,7 @@
           <a:p>
             <a:fld id="{CF630EC3-FE51-44CC-ADE4-A9AF53AF4C2B}" type="datetimeFigureOut">
               <a:rPr lang="en-US" smtClean="0"/>
-              <a:t>2/13/2018</a:t>
+              <a:t>2/14/2018</a:t>
             </a:fld>
             <a:endParaRPr lang="en-US"/>
           </a:p>
@@ -2217,7 +2217,7 @@
           <a:p>
             <a:fld id="{CF630EC3-FE51-44CC-ADE4-A9AF53AF4C2B}" type="datetimeFigureOut">
               <a:rPr lang="en-US" smtClean="0"/>
-              <a:t>2/13/2018</a:t>
+              <a:t>2/14/2018</a:t>
             </a:fld>
             <a:endParaRPr lang="en-US"/>
           </a:p>
@@ -2639,7 +2639,7 @@
           <a:p>
             <a:fld id="{CF630EC3-FE51-44CC-ADE4-A9AF53AF4C2B}" type="datetimeFigureOut">
               <a:rPr lang="en-US" smtClean="0"/>
-              <a:t>2/13/2018</a:t>
+              <a:t>2/14/2018</a:t>
             </a:fld>
             <a:endParaRPr lang="en-US"/>
           </a:p>
@@ -2757,7 +2757,7 @@
           <a:p>
             <a:fld id="{CF630EC3-FE51-44CC-ADE4-A9AF53AF4C2B}" type="datetimeFigureOut">
               <a:rPr lang="en-US" smtClean="0"/>
-              <a:t>2/13/2018</a:t>
+              <a:t>2/14/2018</a:t>
             </a:fld>
             <a:endParaRPr lang="en-US"/>
           </a:p>
@@ -2852,7 +2852,7 @@
           <a:p>
             <a:fld id="{CF630EC3-FE51-44CC-ADE4-A9AF53AF4C2B}" type="datetimeFigureOut">
               <a:rPr lang="en-US" smtClean="0"/>
-              <a:t>2/13/2018</a:t>
+              <a:t>2/14/2018</a:t>
             </a:fld>
             <a:endParaRPr lang="en-US"/>
           </a:p>
@@ -3125,7 +3125,7 @@
           <a:p>
             <a:fld id="{CF630EC3-FE51-44CC-ADE4-A9AF53AF4C2B}" type="datetimeFigureOut">
               <a:rPr lang="en-US" smtClean="0"/>
-              <a:t>2/13/2018</a:t>
+              <a:t>2/14/2018</a:t>
             </a:fld>
             <a:endParaRPr lang="en-US"/>
           </a:p>
@@ -3390,7 +3390,7 @@
           <a:p>
             <a:fld id="{CF630EC3-FE51-44CC-ADE4-A9AF53AF4C2B}" type="datetimeFigureOut">
               <a:rPr lang="en-US" smtClean="0"/>
-              <a:t>2/13/2018</a:t>
+              <a:t>2/14/2018</a:t>
             </a:fld>
             <a:endParaRPr lang="en-US"/>
           </a:p>
@@ -3639,7 +3639,7 @@
           <a:p>
             <a:fld id="{CF630EC3-FE51-44CC-ADE4-A9AF53AF4C2B}" type="datetimeFigureOut">
               <a:rPr lang="en-US" smtClean="0"/>
-              <a:t>2/13/2018</a:t>
+              <a:t>2/14/2018</a:t>
             </a:fld>
             <a:endParaRPr lang="en-US"/>
           </a:p>
@@ -4794,15 +4794,7 @@
           <a:p>
             <a:r>
               <a:rPr lang="en-US" dirty="0"/>
-              <a:t>If united way work like us to continue making the </a:t>
-            </a:r>
-            <a:r>
-              <a:rPr lang="en-US" dirty="0" err="1"/>
-              <a:t>Forio</a:t>
-            </a:r>
-            <a:r>
-              <a:rPr lang="en-US" dirty="0"/>
-              <a:t> app then we can.  Alternatively, we can use </a:t>
+              <a:t>Alternatively, we can use </a:t>
             </a:r>
             <a:r>
               <a:rPr lang="en-US" dirty="0" err="1"/>
@@ -5281,7 +5273,7 @@
             <p:spPr>
               <a:xfrm>
                 <a:off x="1202919" y="4145280"/>
-                <a:ext cx="5493555" cy="1237903"/>
+                <a:ext cx="5582746" cy="1237903"/>
               </a:xfrm>
               <a:prstGeom prst="rect">
                 <a:avLst/>
@@ -5488,6 +5480,34 @@
                               </m:ctrlPr>
                             </m:fPr>
                             <m:num>
+                              <m:sSub>
+                                <m:sSubPr>
+                                  <m:ctrlPr>
+                                    <a:rPr lang="en-US" b="0" i="1" smtClean="0">
+                                      <a:latin typeface="Cambria Math" panose="02040503050406030204" pitchFamily="18" charset="0"/>
+                                      <a:ea typeface="Cambria Math" panose="02040503050406030204" pitchFamily="18" charset="0"/>
+                                    </a:rPr>
+                                  </m:ctrlPr>
+                                </m:sSubPr>
+                                <m:e>
+                                  <m:r>
+                                    <a:rPr lang="en-US" b="0" i="1" smtClean="0">
+                                      <a:latin typeface="Cambria Math" panose="02040503050406030204" pitchFamily="18" charset="0"/>
+                                      <a:ea typeface="Cambria Math" panose="02040503050406030204" pitchFamily="18" charset="0"/>
+                                    </a:rPr>
+                                    <m:t>𝑥</m:t>
+                                  </m:r>
+                                </m:e>
+                                <m:sub>
+                                  <m:r>
+                                    <a:rPr lang="en-US" b="0" i="1" smtClean="0">
+                                      <a:latin typeface="Cambria Math" panose="02040503050406030204" pitchFamily="18" charset="0"/>
+                                      <a:ea typeface="Cambria Math" panose="02040503050406030204" pitchFamily="18" charset="0"/>
+                                    </a:rPr>
+                                    <m:t>𝑛𝑚</m:t>
+                                  </m:r>
+                                </m:sub>
+                              </m:sSub>
                               <m:r>
                                 <a:rPr lang="en-US" b="0" i="1" smtClean="0">
                                   <a:latin typeface="Cambria Math" panose="02040503050406030204" pitchFamily="18" charset="0"/>
@@ -5813,7 +5833,7 @@
             <p:spPr>
               <a:xfrm>
                 <a:off x="1202919" y="4145280"/>
-                <a:ext cx="5493555" cy="1237903"/>
+                <a:ext cx="5582746" cy="1237903"/>
               </a:xfrm>
               <a:prstGeom prst="rect">
                 <a:avLst/>
@@ -5840,8 +5860,8 @@
           </p:sp>
         </mc:Fallback>
       </mc:AlternateContent>
-      <mc:AlternateContent xmlns:mc="http://schemas.openxmlformats.org/markup-compatibility/2006">
-        <mc:Choice xmlns:a14="http://schemas.microsoft.com/office/drawing/2010/main" Requires="a14">
+      <mc:AlternateContent xmlns:mc="http://schemas.openxmlformats.org/markup-compatibility/2006" xmlns:a14="http://schemas.microsoft.com/office/drawing/2010/main">
+        <mc:Choice Requires="a14">
           <p:sp>
             <p:nvSpPr>
               <p:cNvPr id="9" name="TextBox 8">
@@ -5883,6 +5903,7 @@
               </a:bodyPr>
               <a:lstStyle/>
               <a:p>
+                <a:pPr/>
                 <a14:m>
                   <m:oMathPara xmlns:m="http://schemas.openxmlformats.org/officeDocument/2006/math">
                     <m:oMathParaPr>
@@ -6015,7 +6036,13 @@
                                   <a:rPr lang="en-US" b="0" i="1" smtClean="0">
                                     <a:latin typeface="Cambria Math" panose="02040503050406030204" pitchFamily="18" charset="0"/>
                                   </a:rPr>
-                                  <m:t>1/7</m:t>
+                                  <m:t>1</m:t>
+                                </m:r>
+                                <m:r>
+                                  <a:rPr lang="en-US" b="0" i="1" smtClean="0">
+                                    <a:latin typeface="Cambria Math" panose="02040503050406030204" pitchFamily="18" charset="0"/>
+                                  </a:rPr>
+                                  <m:t>/7</m:t>
                                 </m:r>
                               </m:e>
                               <m:e>
@@ -6151,7 +6178,7 @@
             </p:txBody>
           </p:sp>
         </mc:Choice>
-        <mc:Fallback>
+        <mc:Fallback xmlns="">
           <p:sp>
             <p:nvSpPr>
               <p:cNvPr id="9" name="TextBox 8">
@@ -6438,8 +6465,8 @@
           </a:p>
         </p:txBody>
       </p:sp>
-      <mc:AlternateContent xmlns:mc="http://schemas.openxmlformats.org/markup-compatibility/2006">
-        <mc:Choice xmlns:a14="http://schemas.microsoft.com/office/drawing/2010/main" Requires="a14">
+      <mc:AlternateContent xmlns:mc="http://schemas.openxmlformats.org/markup-compatibility/2006" xmlns:a14="http://schemas.microsoft.com/office/drawing/2010/main">
+        <mc:Choice Requires="a14">
           <p:sp>
             <p:nvSpPr>
               <p:cNvPr id="3" name="Content Placeholder 2">
@@ -6629,7 +6656,7 @@
             </p:txBody>
           </p:sp>
         </mc:Choice>
-        <mc:Fallback>
+        <mc:Fallback xmlns="">
           <p:sp>
             <p:nvSpPr>
               <p:cNvPr id="3" name="Content Placeholder 2">
@@ -6905,8 +6932,8 @@
           </a:prstGeom>
         </p:spPr>
       </p:pic>
-      <mc:AlternateContent xmlns:mc="http://schemas.openxmlformats.org/markup-compatibility/2006">
-        <mc:Choice xmlns:a14="http://schemas.microsoft.com/office/drawing/2010/main" Requires="a14">
+      <mc:AlternateContent xmlns:mc="http://schemas.openxmlformats.org/markup-compatibility/2006" xmlns:a14="http://schemas.microsoft.com/office/drawing/2010/main">
+        <mc:Choice Requires="a14">
           <p:sp>
             <p:nvSpPr>
               <p:cNvPr id="7" name="TextBox 6">
@@ -6964,7 +6991,7 @@
             </p:txBody>
           </p:sp>
         </mc:Choice>
-        <mc:Fallback>
+        <mc:Fallback xmlns="">
           <p:sp>
             <p:nvSpPr>
               <p:cNvPr id="7" name="TextBox 6">
@@ -7009,8 +7036,8 @@
           </p:sp>
         </mc:Fallback>
       </mc:AlternateContent>
-      <mc:AlternateContent xmlns:mc="http://schemas.openxmlformats.org/markup-compatibility/2006">
-        <mc:Choice xmlns:a14="http://schemas.microsoft.com/office/drawing/2010/main" Requires="a14">
+      <mc:AlternateContent xmlns:mc="http://schemas.openxmlformats.org/markup-compatibility/2006" xmlns:a14="http://schemas.microsoft.com/office/drawing/2010/main">
+        <mc:Choice Requires="a14">
           <p:sp>
             <p:nvSpPr>
               <p:cNvPr id="10" name="TextBox 9">
@@ -7078,7 +7105,7 @@
             </p:txBody>
           </p:sp>
         </mc:Choice>
-        <mc:Fallback>
+        <mc:Fallback xmlns="">
           <p:sp>
             <p:nvSpPr>
               <p:cNvPr id="10" name="TextBox 9">
@@ -7123,8 +7150,8 @@
           </p:sp>
         </mc:Fallback>
       </mc:AlternateContent>
-      <mc:AlternateContent xmlns:mc="http://schemas.openxmlformats.org/markup-compatibility/2006">
-        <mc:Choice xmlns:a14="http://schemas.microsoft.com/office/drawing/2010/main" Requires="a14">
+      <mc:AlternateContent xmlns:mc="http://schemas.openxmlformats.org/markup-compatibility/2006" xmlns:a14="http://schemas.microsoft.com/office/drawing/2010/main">
+        <mc:Choice Requires="a14">
           <p:sp>
             <p:nvSpPr>
               <p:cNvPr id="11" name="TextBox 10">
@@ -7193,7 +7220,7 @@
             </p:txBody>
           </p:sp>
         </mc:Choice>
-        <mc:Fallback>
+        <mc:Fallback xmlns="">
           <p:sp>
             <p:nvSpPr>
               <p:cNvPr id="11" name="TextBox 10">
@@ -7238,8 +7265,8 @@
           </p:sp>
         </mc:Fallback>
       </mc:AlternateContent>
-      <mc:AlternateContent xmlns:mc="http://schemas.openxmlformats.org/markup-compatibility/2006">
-        <mc:Choice xmlns:a14="http://schemas.microsoft.com/office/drawing/2010/main" Requires="a14">
+      <mc:AlternateContent xmlns:mc="http://schemas.openxmlformats.org/markup-compatibility/2006" xmlns:a14="http://schemas.microsoft.com/office/drawing/2010/main">
+        <mc:Choice Requires="a14">
           <p:sp>
             <p:nvSpPr>
               <p:cNvPr id="12" name="TextBox 11">
@@ -7346,7 +7373,7 @@
             </p:txBody>
           </p:sp>
         </mc:Choice>
-        <mc:Fallback>
+        <mc:Fallback xmlns="">
           <p:sp>
             <p:nvSpPr>
               <p:cNvPr id="12" name="TextBox 11">
@@ -7470,8 +7497,8 @@
           </a:p>
         </p:txBody>
       </p:sp>
-      <mc:AlternateContent xmlns:mc="http://schemas.openxmlformats.org/markup-compatibility/2006">
-        <mc:Choice xmlns:a14="http://schemas.microsoft.com/office/drawing/2010/main" Requires="a14">
+      <mc:AlternateContent xmlns:mc="http://schemas.openxmlformats.org/markup-compatibility/2006" xmlns:a14="http://schemas.microsoft.com/office/drawing/2010/main">
+        <mc:Choice Requires="a14">
           <p:sp>
             <p:nvSpPr>
               <p:cNvPr id="3" name="Rectangle 2">
@@ -7573,7 +7600,7 @@
             </p:txBody>
           </p:sp>
         </mc:Choice>
-        <mc:Fallback>
+        <mc:Fallback xmlns="">
           <p:sp>
             <p:nvSpPr>
               <p:cNvPr id="3" name="Rectangle 2">
@@ -7746,8 +7773,8 @@
           </a:p>
         </p:txBody>
       </p:sp>
-      <mc:AlternateContent xmlns:mc="http://schemas.openxmlformats.org/markup-compatibility/2006">
-        <mc:Choice xmlns:a14="http://schemas.microsoft.com/office/drawing/2010/main" Requires="a14">
+      <mc:AlternateContent xmlns:mc="http://schemas.openxmlformats.org/markup-compatibility/2006" xmlns:a14="http://schemas.microsoft.com/office/drawing/2010/main">
+        <mc:Choice Requires="a14">
           <p:sp>
             <p:nvSpPr>
               <p:cNvPr id="4" name="Rectangle 3">
@@ -7853,7 +7880,7 @@
             </p:txBody>
           </p:sp>
         </mc:Choice>
-        <mc:Fallback>
+        <mc:Fallback xmlns="">
           <p:sp>
             <p:nvSpPr>
               <p:cNvPr id="4" name="Rectangle 3">

</xml_diff>